<commit_message>
added slides in presentation
</commit_message>
<xml_diff>
--- a/PropertiesFile-CRUD.pptx
+++ b/PropertiesFile-CRUD.pptx
@@ -316,7 +316,7 @@
           <a:p>
             <a:fld id="{28CF3BA0-83D9-4CD6-95D3-DB9AB7C8E2E3}" type="datetimeFigureOut">
               <a:rPr lang="en-US" smtClean="0"/>
-              <a:t>11/28/2022</a:t>
+              <a:t>11/29/2022</a:t>
             </a:fld>
             <a:endParaRPr lang="en-US"/>
           </a:p>
@@ -752,7 +752,7 @@
           <a:p>
             <a:fld id="{28CF3BA0-83D9-4CD6-95D3-DB9AB7C8E2E3}" type="datetimeFigureOut">
               <a:rPr lang="en-US" smtClean="0"/>
-              <a:t>11/28/2022</a:t>
+              <a:t>11/29/2022</a:t>
             </a:fld>
             <a:endParaRPr lang="en-US"/>
           </a:p>
@@ -1002,7 +1002,7 @@
           <a:p>
             <a:fld id="{28CF3BA0-83D9-4CD6-95D3-DB9AB7C8E2E3}" type="datetimeFigureOut">
               <a:rPr lang="en-US" smtClean="0"/>
-              <a:t>11/28/2022</a:t>
+              <a:t>11/29/2022</a:t>
             </a:fld>
             <a:endParaRPr lang="en-US"/>
           </a:p>
@@ -1310,7 +1310,7 @@
           <a:p>
             <a:fld id="{28CF3BA0-83D9-4CD6-95D3-DB9AB7C8E2E3}" type="datetimeFigureOut">
               <a:rPr lang="en-US" smtClean="0"/>
-              <a:t>11/28/2022</a:t>
+              <a:t>11/29/2022</a:t>
             </a:fld>
             <a:endParaRPr lang="en-US"/>
           </a:p>
@@ -1628,7 +1628,7 @@
           <a:p>
             <a:fld id="{28CF3BA0-83D9-4CD6-95D3-DB9AB7C8E2E3}" type="datetimeFigureOut">
               <a:rPr lang="en-US" smtClean="0"/>
-              <a:t>11/28/2022</a:t>
+              <a:t>11/29/2022</a:t>
             </a:fld>
             <a:endParaRPr lang="en-US"/>
           </a:p>
@@ -1930,7 +1930,7 @@
           <a:p>
             <a:fld id="{28CF3BA0-83D9-4CD6-95D3-DB9AB7C8E2E3}" type="datetimeFigureOut">
               <a:rPr lang="en-US" smtClean="0"/>
-              <a:t>11/28/2022</a:t>
+              <a:t>11/29/2022</a:t>
             </a:fld>
             <a:endParaRPr lang="en-US"/>
           </a:p>
@@ -2297,7 +2297,7 @@
           <a:p>
             <a:fld id="{28CF3BA0-83D9-4CD6-95D3-DB9AB7C8E2E3}" type="datetimeFigureOut">
               <a:rPr lang="en-US" smtClean="0"/>
-              <a:t>11/28/2022</a:t>
+              <a:t>11/29/2022</a:t>
             </a:fld>
             <a:endParaRPr lang="en-US"/>
           </a:p>
@@ -2471,7 +2471,7 @@
           <a:p>
             <a:fld id="{28CF3BA0-83D9-4CD6-95D3-DB9AB7C8E2E3}" type="datetimeFigureOut">
               <a:rPr lang="en-US" smtClean="0"/>
-              <a:t>11/28/2022</a:t>
+              <a:t>11/29/2022</a:t>
             </a:fld>
             <a:endParaRPr lang="en-US"/>
           </a:p>
@@ -2651,7 +2651,7 @@
           <a:p>
             <a:fld id="{28CF3BA0-83D9-4CD6-95D3-DB9AB7C8E2E3}" type="datetimeFigureOut">
               <a:rPr lang="en-US" smtClean="0"/>
-              <a:t>11/28/2022</a:t>
+              <a:t>11/29/2022</a:t>
             </a:fld>
             <a:endParaRPr lang="en-US"/>
           </a:p>
@@ -2821,7 +2821,7 @@
           <a:p>
             <a:fld id="{28CF3BA0-83D9-4CD6-95D3-DB9AB7C8E2E3}" type="datetimeFigureOut">
               <a:rPr lang="en-US" smtClean="0"/>
-              <a:t>11/28/2022</a:t>
+              <a:t>11/29/2022</a:t>
             </a:fld>
             <a:endParaRPr lang="en-US"/>
           </a:p>
@@ -3071,7 +3071,7 @@
           <a:p>
             <a:fld id="{28CF3BA0-83D9-4CD6-95D3-DB9AB7C8E2E3}" type="datetimeFigureOut">
               <a:rPr lang="en-US" smtClean="0"/>
-              <a:t>11/28/2022</a:t>
+              <a:t>11/29/2022</a:t>
             </a:fld>
             <a:endParaRPr lang="en-US"/>
           </a:p>
@@ -3307,7 +3307,7 @@
           <a:p>
             <a:fld id="{28CF3BA0-83D9-4CD6-95D3-DB9AB7C8E2E3}" type="datetimeFigureOut">
               <a:rPr lang="en-US" smtClean="0"/>
-              <a:t>11/28/2022</a:t>
+              <a:t>11/29/2022</a:t>
             </a:fld>
             <a:endParaRPr lang="en-US"/>
           </a:p>
@@ -3689,7 +3689,7 @@
           <a:p>
             <a:fld id="{28CF3BA0-83D9-4CD6-95D3-DB9AB7C8E2E3}" type="datetimeFigureOut">
               <a:rPr lang="en-US" smtClean="0"/>
-              <a:t>11/28/2022</a:t>
+              <a:t>11/29/2022</a:t>
             </a:fld>
             <a:endParaRPr lang="en-US"/>
           </a:p>
@@ -3807,7 +3807,7 @@
           <a:p>
             <a:fld id="{28CF3BA0-83D9-4CD6-95D3-DB9AB7C8E2E3}" type="datetimeFigureOut">
               <a:rPr lang="en-US" smtClean="0"/>
-              <a:t>11/28/2022</a:t>
+              <a:t>11/29/2022</a:t>
             </a:fld>
             <a:endParaRPr lang="en-US"/>
           </a:p>
@@ -3902,7 +3902,7 @@
           <a:p>
             <a:fld id="{28CF3BA0-83D9-4CD6-95D3-DB9AB7C8E2E3}" type="datetimeFigureOut">
               <a:rPr lang="en-US" smtClean="0"/>
-              <a:t>11/28/2022</a:t>
+              <a:t>11/29/2022</a:t>
             </a:fld>
             <a:endParaRPr lang="en-US"/>
           </a:p>
@@ -4157,7 +4157,7 @@
           <a:p>
             <a:fld id="{28CF3BA0-83D9-4CD6-95D3-DB9AB7C8E2E3}" type="datetimeFigureOut">
               <a:rPr lang="en-US" smtClean="0"/>
-              <a:t>11/28/2022</a:t>
+              <a:t>11/29/2022</a:t>
             </a:fld>
             <a:endParaRPr lang="en-US"/>
           </a:p>
@@ -4440,7 +4440,7 @@
           <a:p>
             <a:fld id="{28CF3BA0-83D9-4CD6-95D3-DB9AB7C8E2E3}" type="datetimeFigureOut">
               <a:rPr lang="en-US" smtClean="0"/>
-              <a:t>11/28/2022</a:t>
+              <a:t>11/29/2022</a:t>
             </a:fld>
             <a:endParaRPr lang="en-US"/>
           </a:p>
@@ -4846,7 +4846,7 @@
           <a:p>
             <a:fld id="{28CF3BA0-83D9-4CD6-95D3-DB9AB7C8E2E3}" type="datetimeFigureOut">
               <a:rPr lang="en-US" smtClean="0"/>
-              <a:t>11/28/2022</a:t>
+              <a:t>11/29/2022</a:t>
             </a:fld>
             <a:endParaRPr lang="en-US"/>
           </a:p>
@@ -7250,12 +7250,12 @@
               <a:t>Използване </a:t>
             </a:r>
             <a:r>
-              <a:rPr lang="en-US" sz="2400" dirty="0">
+              <a:rPr lang="en-US" sz="2400" dirty="0" err="1">
                 <a:solidFill>
                   <a:schemeClr val="tx1"/>
                 </a:solidFill>
               </a:rPr>
-              <a:t>@DataSourceAutoConfiguration</a:t>
+              <a:t>DataSourceAutoConfiguration</a:t>
             </a:r>
             <a:endParaRPr lang="bg-BG" sz="2400" dirty="0">
               <a:solidFill>

</xml_diff>